<commit_message>
Fixed spelling error in slide master #DOH!
</commit_message>
<xml_diff>
--- a/GoingNativeWithKendoUIMobile.pptx
+++ b/GoingNativeWithKendoUIMobile.pptx
@@ -2,7 +2,7 @@
 <file path=ppt/presentation.xml><?xml version="1.0" encoding="utf-8"?>
 <p:presentation xmlns:a="http://schemas.openxmlformats.org/drawingml/2006/main" xmlns:r="http://schemas.openxmlformats.org/officeDocument/2006/relationships" xmlns:p="http://schemas.openxmlformats.org/presentationml/2006/main" saveSubsetFonts="1">
   <p:sldMasterIdLst>
-    <p:sldMasterId id="2147483756" r:id="rId1"/>
+    <p:sldMasterId id="2147483780" r:id="rId1"/>
   </p:sldMasterIdLst>
   <p:notesMasterIdLst>
     <p:notesMasterId r:id="rId32"/>
@@ -229,7 +229,7 @@
           <a:p>
             <a:fld id="{D39C16E0-0246-47C1-91A7-ED3E8784215F}" type="datetimeFigureOut">
               <a:rPr lang="en-US" smtClean="0"/>
-              <a:t>8/21/2012</a:t>
+              <a:t>8/29/2012</a:t>
             </a:fld>
             <a:endParaRPr lang="en-US"/>
           </a:p>
@@ -15379,26 +15379,18 @@
             </a:br>
             <a:r>
               <a:rPr lang="en-US" sz="1400" dirty="0" smtClean="0"/>
-              <a:t>Senior </a:t>
-            </a:r>
-            <a:r>
-              <a:rPr lang="en-US" sz="1400" dirty="0" err="1" smtClean="0"/>
-              <a:t>Sofware</a:t>
-            </a:r>
-            <a:r>
-              <a:rPr lang="en-US" sz="1400" dirty="0" smtClean="0"/>
-              <a:t> Engineer</a:t>
+              <a:t>Senior Software Engineer</a:t>
             </a:r>
             <a:br>
               <a:rPr lang="en-US" sz="1400" dirty="0" smtClean="0"/>
             </a:br>
             <a:r>
               <a:rPr lang="en-US" sz="1400" dirty="0" smtClean="0"/>
-              <a:t>Skyline Technologies, </a:t>
-            </a:r>
-            <a:r>
-              <a:rPr lang="en-US" sz="1400" dirty="0" err="1" smtClean="0"/>
-              <a:t>Inc</a:t>
+              <a:t>Skyline Technologies</a:t>
+            </a:r>
+            <a:r>
+              <a:rPr lang="en-US" sz="1400" smtClean="0"/>
+              <a:t>, Inc.</a:t>
             </a:r>
             <a:endParaRPr lang="en-US" sz="1400" dirty="0" smtClean="0"/>
           </a:p>
@@ -15456,7 +15448,7 @@
     </p:spTree>
     <p:extLst>
       <p:ext uri="{BB962C8B-B14F-4D97-AF65-F5344CB8AC3E}">
-        <p14:creationId xmlns:p14="http://schemas.microsoft.com/office/powerpoint/2010/main" val="3480604219"/>
+        <p14:creationId xmlns:p14="http://schemas.microsoft.com/office/powerpoint/2010/main" val="715943257"/>
       </p:ext>
     </p:extLst>
   </p:cSld>
@@ -15573,7 +15565,7 @@
     </p:spTree>
     <p:extLst>
       <p:ext uri="{BB962C8B-B14F-4D97-AF65-F5344CB8AC3E}">
-        <p14:creationId xmlns:p14="http://schemas.microsoft.com/office/powerpoint/2010/main" val="2904346738"/>
+        <p14:creationId xmlns:p14="http://schemas.microsoft.com/office/powerpoint/2010/main" val="1584916426"/>
       </p:ext>
     </p:extLst>
   </p:cSld>
@@ -15695,7 +15687,7 @@
     </p:spTree>
     <p:extLst>
       <p:ext uri="{BB962C8B-B14F-4D97-AF65-F5344CB8AC3E}">
-        <p14:creationId xmlns:p14="http://schemas.microsoft.com/office/powerpoint/2010/main" val="4120564254"/>
+        <p14:creationId xmlns:p14="http://schemas.microsoft.com/office/powerpoint/2010/main" val="1771247842"/>
       </p:ext>
     </p:extLst>
   </p:cSld>
@@ -15807,7 +15799,7 @@
     </p:spTree>
     <p:extLst>
       <p:ext uri="{BB962C8B-B14F-4D97-AF65-F5344CB8AC3E}">
-        <p14:creationId xmlns:p14="http://schemas.microsoft.com/office/powerpoint/2010/main" val="2426993405"/>
+        <p14:creationId xmlns:p14="http://schemas.microsoft.com/office/powerpoint/2010/main" val="277518296"/>
       </p:ext>
     </p:extLst>
   </p:cSld>
@@ -16000,7 +15992,7 @@
     </p:spTree>
     <p:extLst>
       <p:ext uri="{BB962C8B-B14F-4D97-AF65-F5344CB8AC3E}">
-        <p14:creationId xmlns:p14="http://schemas.microsoft.com/office/powerpoint/2010/main" val="164168761"/>
+        <p14:creationId xmlns:p14="http://schemas.microsoft.com/office/powerpoint/2010/main" val="5090609"/>
       </p:ext>
     </p:extLst>
   </p:cSld>
@@ -16174,7 +16166,7 @@
     </p:spTree>
     <p:extLst>
       <p:ext uri="{BB962C8B-B14F-4D97-AF65-F5344CB8AC3E}">
-        <p14:creationId xmlns:p14="http://schemas.microsoft.com/office/powerpoint/2010/main" val="196225579"/>
+        <p14:creationId xmlns:p14="http://schemas.microsoft.com/office/powerpoint/2010/main" val="2631897972"/>
       </p:ext>
     </p:extLst>
   </p:cSld>
@@ -16486,7 +16478,7 @@
     </p:spTree>
     <p:extLst>
       <p:ext uri="{BB962C8B-B14F-4D97-AF65-F5344CB8AC3E}">
-        <p14:creationId xmlns:p14="http://schemas.microsoft.com/office/powerpoint/2010/main" val="987173951"/>
+        <p14:creationId xmlns:p14="http://schemas.microsoft.com/office/powerpoint/2010/main" val="626941221"/>
       </p:ext>
     </p:extLst>
   </p:cSld>
@@ -16546,7 +16538,7 @@
     </p:spTree>
     <p:extLst>
       <p:ext uri="{BB962C8B-B14F-4D97-AF65-F5344CB8AC3E}">
-        <p14:creationId xmlns:p14="http://schemas.microsoft.com/office/powerpoint/2010/main" val="3504218556"/>
+        <p14:creationId xmlns:p14="http://schemas.microsoft.com/office/powerpoint/2010/main" val="1720382563"/>
       </p:ext>
     </p:extLst>
   </p:cSld>
@@ -16606,7 +16598,7 @@
     </p:spTree>
     <p:extLst>
       <p:ext uri="{BB962C8B-B14F-4D97-AF65-F5344CB8AC3E}">
-        <p14:creationId xmlns:p14="http://schemas.microsoft.com/office/powerpoint/2010/main" val="1836349586"/>
+        <p14:creationId xmlns:p14="http://schemas.microsoft.com/office/powerpoint/2010/main" val="380083411"/>
       </p:ext>
     </p:extLst>
   </p:cSld>
@@ -16838,7 +16830,7 @@
     </p:spTree>
     <p:extLst>
       <p:ext uri="{BB962C8B-B14F-4D97-AF65-F5344CB8AC3E}">
-        <p14:creationId xmlns:p14="http://schemas.microsoft.com/office/powerpoint/2010/main" val="3037801332"/>
+        <p14:creationId xmlns:p14="http://schemas.microsoft.com/office/powerpoint/2010/main" val="219662349"/>
       </p:ext>
     </p:extLst>
   </p:cSld>
@@ -17050,7 +17042,7 @@
     </p:spTree>
     <p:extLst>
       <p:ext uri="{BB962C8B-B14F-4D97-AF65-F5344CB8AC3E}">
-        <p14:creationId xmlns:p14="http://schemas.microsoft.com/office/powerpoint/2010/main" val="140484919"/>
+        <p14:creationId xmlns:p14="http://schemas.microsoft.com/office/powerpoint/2010/main" val="2957243056"/>
       </p:ext>
     </p:extLst>
   </p:cSld>
@@ -17247,23 +17239,23 @@
     </p:spTree>
     <p:extLst>
       <p:ext uri="{BB962C8B-B14F-4D97-AF65-F5344CB8AC3E}">
-        <p14:creationId xmlns:p14="http://schemas.microsoft.com/office/powerpoint/2010/main" val="3326148766"/>
+        <p14:creationId xmlns:p14="http://schemas.microsoft.com/office/powerpoint/2010/main" val="2157614414"/>
       </p:ext>
     </p:extLst>
   </p:cSld>
   <p:clrMap bg1="lt1" tx1="dk1" bg2="lt2" tx2="dk2" accent1="accent1" accent2="accent2" accent3="accent3" accent4="accent4" accent5="accent5" accent6="accent6" hlink="hlink" folHlink="folHlink"/>
   <p:sldLayoutIdLst>
-    <p:sldLayoutId id="2147483757" r:id="rId1"/>
-    <p:sldLayoutId id="2147483758" r:id="rId2"/>
-    <p:sldLayoutId id="2147483759" r:id="rId3"/>
-    <p:sldLayoutId id="2147483760" r:id="rId4"/>
-    <p:sldLayoutId id="2147483761" r:id="rId5"/>
-    <p:sldLayoutId id="2147483762" r:id="rId6"/>
-    <p:sldLayoutId id="2147483763" r:id="rId7"/>
-    <p:sldLayoutId id="2147483764" r:id="rId8"/>
-    <p:sldLayoutId id="2147483765" r:id="rId9"/>
-    <p:sldLayoutId id="2147483766" r:id="rId10"/>
-    <p:sldLayoutId id="2147483767" r:id="rId11"/>
+    <p:sldLayoutId id="2147483781" r:id="rId1"/>
+    <p:sldLayoutId id="2147483782" r:id="rId2"/>
+    <p:sldLayoutId id="2147483783" r:id="rId3"/>
+    <p:sldLayoutId id="2147483784" r:id="rId4"/>
+    <p:sldLayoutId id="2147483785" r:id="rId5"/>
+    <p:sldLayoutId id="2147483786" r:id="rId6"/>
+    <p:sldLayoutId id="2147483787" r:id="rId7"/>
+    <p:sldLayoutId id="2147483788" r:id="rId8"/>
+    <p:sldLayoutId id="2147483789" r:id="rId9"/>
+    <p:sldLayoutId id="2147483790" r:id="rId10"/>
+    <p:sldLayoutId id="2147483791" r:id="rId11"/>
   </p:sldLayoutIdLst>
   <p:timing>
     <p:tnLst>
@@ -36470,11 +36462,7 @@
           <a:p>
             <a:r>
               <a:rPr lang="en-US" sz="1800" dirty="0"/>
-              <a:t>Kendo UI </a:t>
-            </a:r>
-            <a:r>
-              <a:rPr lang="en-US" sz="1800" dirty="0"/>
-              <a:t>Mobile</a:t>
+              <a:t>Kendo UI Mobile</a:t>
             </a:r>
           </a:p>
           <a:p>
@@ -36754,11 +36742,7 @@
           <a:p>
             <a:r>
               <a:rPr lang="en-US" sz="1800" kern="0" dirty="0"/>
-              <a:t>Find </a:t>
-            </a:r>
-            <a:r>
-              <a:rPr lang="en-US" sz="1800" kern="0" dirty="0"/>
-              <a:t>me:</a:t>
+              <a:t>Find me:</a:t>
             </a:r>
           </a:p>
           <a:p>
@@ -40366,19 +40350,7 @@
               <a:rPr lang="en-US" sz="1800" dirty="0">
                 <a:latin typeface="+mn-lt"/>
               </a:rPr>
-              <a:t>             </a:t>
-            </a:r>
-            <a:r>
-              <a:rPr lang="en-US" sz="1800" dirty="0">
-                <a:latin typeface="+mn-lt"/>
-              </a:rPr>
-              <a:t>    7.0 </a:t>
-            </a:r>
-            <a:r>
-              <a:rPr lang="en-US" sz="1800" dirty="0">
-                <a:latin typeface="+mn-lt"/>
-              </a:rPr>
-              <a:t>+</a:t>
+              <a:t>                 7.0 +</a:t>
             </a:r>
           </a:p>
           <a:p>
@@ -40391,19 +40363,7 @@
               <a:rPr lang="en-US" sz="1800" dirty="0">
                 <a:latin typeface="+mn-lt"/>
               </a:rPr>
-              <a:t>             </a:t>
-            </a:r>
-            <a:r>
-              <a:rPr lang="en-US" sz="1800" dirty="0">
-                <a:latin typeface="+mn-lt"/>
-              </a:rPr>
-              <a:t>  10.0 </a:t>
-            </a:r>
-            <a:r>
-              <a:rPr lang="en-US" sz="1800" dirty="0">
-                <a:latin typeface="+mn-lt"/>
-              </a:rPr>
-              <a:t>+</a:t>
+              <a:t>               10.0 +</a:t>
             </a:r>
           </a:p>
           <a:p>
@@ -40417,19 +40377,7 @@
               <a:rPr lang="en-US" sz="1800" dirty="0">
                 <a:latin typeface="+mn-lt"/>
               </a:rPr>
-              <a:t>              </a:t>
-            </a:r>
-            <a:r>
-              <a:rPr lang="en-US" sz="1800" dirty="0">
-                <a:latin typeface="+mn-lt"/>
-              </a:rPr>
-              <a:t>  All </a:t>
-            </a:r>
-            <a:r>
-              <a:rPr lang="en-US" sz="1800" dirty="0">
-                <a:latin typeface="+mn-lt"/>
-              </a:rPr>
-              <a:t>versions</a:t>
+              <a:t>                All versions</a:t>
             </a:r>
           </a:p>
           <a:p>
@@ -40443,19 +40391,7 @@
               <a:rPr lang="en-US" sz="1800" dirty="0">
                 <a:latin typeface="+mn-lt"/>
               </a:rPr>
-              <a:t>              </a:t>
-            </a:r>
-            <a:r>
-              <a:rPr lang="en-US" sz="1800" dirty="0">
-                <a:latin typeface="+mn-lt"/>
-              </a:rPr>
-              <a:t> 10.0 </a:t>
-            </a:r>
-            <a:r>
-              <a:rPr lang="en-US" sz="1800" dirty="0">
-                <a:latin typeface="+mn-lt"/>
-              </a:rPr>
-              <a:t>+</a:t>
+              <a:t>               10.0 +</a:t>
             </a:r>
           </a:p>
           <a:p>
@@ -40470,19 +40406,7 @@
               <a:rPr lang="en-US" sz="1800" dirty="0">
                 <a:latin typeface="+mn-lt"/>
               </a:rPr>
-              <a:t>             			</a:t>
-            </a:r>
-            <a:r>
-              <a:rPr lang="en-US" sz="1800" dirty="0">
-                <a:latin typeface="+mn-lt"/>
-              </a:rPr>
-              <a:t>  4.0 </a:t>
-            </a:r>
-            <a:r>
-              <a:rPr lang="en-US" sz="1800" dirty="0">
-                <a:latin typeface="+mn-lt"/>
-              </a:rPr>
-              <a:t>+</a:t>
+              <a:t>             			  4.0 +</a:t>
             </a:r>
           </a:p>
           <a:p>

</xml_diff>